<commit_message>
add classification modeling approach slides; minor updates
</commit_message>
<xml_diff>
--- a/deliverables/presentationcopy.pptx
+++ b/deliverables/presentationcopy.pptx
@@ -5,7 +5,7 @@
     <p:sldMasterId id="2147483648" r:id="rId1"/>
   </p:sldMasterIdLst>
   <p:notesMasterIdLst>
-    <p:notesMasterId r:id="rId17"/>
+    <p:notesMasterId r:id="rId20"/>
   </p:notesMasterIdLst>
   <p:sldIdLst>
     <p:sldId id="256" r:id="rId2"/>
@@ -17,12 +17,15 @@
     <p:sldId id="263" r:id="rId8"/>
     <p:sldId id="269" r:id="rId9"/>
     <p:sldId id="259" r:id="rId10"/>
-    <p:sldId id="270" r:id="rId11"/>
-    <p:sldId id="271" r:id="rId12"/>
-    <p:sldId id="272" r:id="rId13"/>
-    <p:sldId id="273" r:id="rId14"/>
-    <p:sldId id="260" r:id="rId15"/>
-    <p:sldId id="261" r:id="rId16"/>
+    <p:sldId id="274" r:id="rId11"/>
+    <p:sldId id="276" r:id="rId12"/>
+    <p:sldId id="277" r:id="rId13"/>
+    <p:sldId id="270" r:id="rId14"/>
+    <p:sldId id="271" r:id="rId15"/>
+    <p:sldId id="272" r:id="rId16"/>
+    <p:sldId id="273" r:id="rId17"/>
+    <p:sldId id="260" r:id="rId18"/>
+    <p:sldId id="261" r:id="rId19"/>
   </p:sldIdLst>
   <p:sldSz cx="12192000" cy="6858000"/>
   <p:notesSz cx="6858000" cy="9144000"/>
@@ -3903,6 +3906,361 @@
   <p:cSld>
     <p:spTree>
       <p:nvGrpSpPr>
+        <p:cNvPr id="1" name="">
+          <a:extLst>
+            <a:ext uri="{FF2B5EF4-FFF2-40B4-BE49-F238E27FC236}">
+              <a16:creationId xmlns:a16="http://schemas.microsoft.com/office/drawing/2014/main" id="{AA57435C-6F0A-1BFF-4614-E28BD49EF3C4}"/>
+            </a:ext>
+          </a:extLst>
+        </p:cNvPr>
+        <p:cNvGrpSpPr/>
+        <p:nvPr/>
+      </p:nvGrpSpPr>
+      <p:grpSpPr>
+        <a:xfrm>
+          <a:off x="0" y="0"/>
+          <a:ext cx="0" cy="0"/>
+          <a:chOff x="0" y="0"/>
+          <a:chExt cx="0" cy="0"/>
+        </a:xfrm>
+      </p:grpSpPr>
+      <p:sp>
+        <p:nvSpPr>
+          <p:cNvPr id="2" name="Title 1">
+            <a:extLst>
+              <a:ext uri="{FF2B5EF4-FFF2-40B4-BE49-F238E27FC236}">
+                <a16:creationId xmlns:a16="http://schemas.microsoft.com/office/drawing/2014/main" id="{BE298269-F6D3-B713-F77C-0BD9B4B3F475}"/>
+              </a:ext>
+            </a:extLst>
+          </p:cNvPr>
+          <p:cNvSpPr>
+            <a:spLocks noGrp="1"/>
+          </p:cNvSpPr>
+          <p:nvPr>
+            <p:ph type="title"/>
+          </p:nvPr>
+        </p:nvSpPr>
+        <p:spPr/>
+        <p:txBody>
+          <a:bodyPr/>
+          <a:lstStyle/>
+          <a:p>
+            <a:r>
+              <a:rPr lang="en-US" dirty="0"/>
+              <a:t>Classification Model Performances:</a:t>
+            </a:r>
+            <a:br>
+              <a:rPr lang="en-US" dirty="0"/>
+            </a:br>
+            <a:r>
+              <a:rPr lang="en-US" dirty="0"/>
+              <a:t>Training and Validation Sets</a:t>
+            </a:r>
+          </a:p>
+        </p:txBody>
+      </p:sp>
+      <p:pic>
+        <p:nvPicPr>
+          <p:cNvPr id="7" name="Picture 6">
+            <a:extLst>
+              <a:ext uri="{FF2B5EF4-FFF2-40B4-BE49-F238E27FC236}">
+                <a16:creationId xmlns:a16="http://schemas.microsoft.com/office/drawing/2014/main" id="{E05C47CB-EB99-2D68-2203-E0228A87260E}"/>
+              </a:ext>
+            </a:extLst>
+          </p:cNvPr>
+          <p:cNvPicPr>
+            <a:picLocks noChangeAspect="1"/>
+          </p:cNvPicPr>
+          <p:nvPr/>
+        </p:nvPicPr>
+        <p:blipFill>
+          <a:blip r:embed="rId2"/>
+          <a:srcRect/>
+          <a:stretch/>
+        </p:blipFill>
+        <p:spPr>
+          <a:xfrm>
+            <a:off x="2974253" y="1690688"/>
+            <a:ext cx="6058297" cy="4035425"/>
+          </a:xfrm>
+          <a:prstGeom prst="rect">
+            <a:avLst/>
+          </a:prstGeom>
+        </p:spPr>
+      </p:pic>
+      <p:sp>
+        <p:nvSpPr>
+          <p:cNvPr id="10" name="TextBox 9">
+            <a:extLst>
+              <a:ext uri="{FF2B5EF4-FFF2-40B4-BE49-F238E27FC236}">
+                <a16:creationId xmlns:a16="http://schemas.microsoft.com/office/drawing/2014/main" id="{A7FC01F7-43E9-37C6-C990-BBF484E80634}"/>
+              </a:ext>
+            </a:extLst>
+          </p:cNvPr>
+          <p:cNvSpPr txBox="1"/>
+          <p:nvPr/>
+        </p:nvSpPr>
+        <p:spPr>
+          <a:xfrm>
+            <a:off x="2430886" y="5726113"/>
+            <a:ext cx="8260948" cy="923330"/>
+          </a:xfrm>
+          <a:prstGeom prst="rect">
+            <a:avLst/>
+          </a:prstGeom>
+          <a:noFill/>
+        </p:spPr>
+        <p:txBody>
+          <a:bodyPr wrap="square">
+            <a:spAutoFit/>
+          </a:bodyPr>
+          <a:lstStyle/>
+          <a:p>
+            <a:pPr marL="285750" indent="-285750">
+              <a:buFont typeface="Arial" panose="020B0604020202020204" pitchFamily="34" charset="0"/>
+              <a:buChar char="•"/>
+            </a:pPr>
+            <a:r>
+              <a:rPr lang="en-US" dirty="0"/>
+              <a:t>For each, Extra Trees Classifier has highest validation F1(macro) score.</a:t>
+            </a:r>
+          </a:p>
+          <a:p>
+            <a:pPr marL="285750" indent="-285750">
+              <a:buFont typeface="Arial" panose="020B0604020202020204" pitchFamily="34" charset="0"/>
+              <a:buChar char="•"/>
+            </a:pPr>
+            <a:r>
+              <a:rPr lang="en-US" dirty="0"/>
+              <a:t>Slight edge over “Naïve” estimator </a:t>
+            </a:r>
+          </a:p>
+          <a:p>
+            <a:pPr marL="285750" indent="-285750">
+              <a:buFont typeface="Arial" panose="020B0604020202020204" pitchFamily="34" charset="0"/>
+              <a:buChar char="•"/>
+            </a:pPr>
+            <a:r>
+              <a:rPr lang="en-US" dirty="0"/>
+              <a:t>For all, every model overfits training data</a:t>
+            </a:r>
+          </a:p>
+        </p:txBody>
+      </p:sp>
+    </p:spTree>
+    <p:extLst>
+      <p:ext uri="{BB962C8B-B14F-4D97-AF65-F5344CB8AC3E}">
+        <p14:creationId xmlns:p14="http://schemas.microsoft.com/office/powerpoint/2010/main" val="1034563762"/>
+      </p:ext>
+    </p:extLst>
+  </p:cSld>
+  <p:clrMapOvr>
+    <a:masterClrMapping/>
+  </p:clrMapOvr>
+</p:sld>
+</file>
+
+<file path=ppt/slides/slide11.xml><?xml version="1.0" encoding="utf-8"?>
+<p:sld xmlns:a="http://schemas.openxmlformats.org/drawingml/2006/main" xmlns:r="http://schemas.openxmlformats.org/officeDocument/2006/relationships" xmlns:p="http://schemas.openxmlformats.org/presentationml/2006/main">
+  <p:cSld>
+    <p:spTree>
+      <p:nvGrpSpPr>
+        <p:cNvPr id="1" name="">
+          <a:extLst>
+            <a:ext uri="{FF2B5EF4-FFF2-40B4-BE49-F238E27FC236}">
+              <a16:creationId xmlns:a16="http://schemas.microsoft.com/office/drawing/2014/main" id="{69B2E202-0FCA-D66B-CB7F-D673608FC3B7}"/>
+            </a:ext>
+          </a:extLst>
+        </p:cNvPr>
+        <p:cNvGrpSpPr/>
+        <p:nvPr/>
+      </p:nvGrpSpPr>
+      <p:grpSpPr>
+        <a:xfrm>
+          <a:off x="0" y="0"/>
+          <a:ext cx="0" cy="0"/>
+          <a:chOff x="0" y="0"/>
+          <a:chExt cx="0" cy="0"/>
+        </a:xfrm>
+      </p:grpSpPr>
+      <p:sp>
+        <p:nvSpPr>
+          <p:cNvPr id="2" name="Title 1">
+            <a:extLst>
+              <a:ext uri="{FF2B5EF4-FFF2-40B4-BE49-F238E27FC236}">
+                <a16:creationId xmlns:a16="http://schemas.microsoft.com/office/drawing/2014/main" id="{57C7E104-D3D4-FE76-9BBA-DE0F16D80218}"/>
+              </a:ext>
+            </a:extLst>
+          </p:cNvPr>
+          <p:cNvSpPr>
+            <a:spLocks noGrp="1"/>
+          </p:cNvSpPr>
+          <p:nvPr>
+            <p:ph type="title"/>
+          </p:nvPr>
+        </p:nvSpPr>
+        <p:spPr/>
+        <p:txBody>
+          <a:bodyPr/>
+          <a:lstStyle/>
+          <a:p>
+            <a:r>
+              <a:rPr lang="en-US" dirty="0"/>
+              <a:t>Classification Models: Results</a:t>
+            </a:r>
+          </a:p>
+        </p:txBody>
+      </p:sp>
+      <p:pic>
+        <p:nvPicPr>
+          <p:cNvPr id="7" name="Picture 6" descr="A blue square with white text&#10;&#10;AI-generated content may be incorrect.">
+            <a:extLst>
+              <a:ext uri="{FF2B5EF4-FFF2-40B4-BE49-F238E27FC236}">
+                <a16:creationId xmlns:a16="http://schemas.microsoft.com/office/drawing/2014/main" id="{B584C747-5017-87A4-D513-C925B6D3961E}"/>
+              </a:ext>
+            </a:extLst>
+          </p:cNvPr>
+          <p:cNvPicPr>
+            <a:picLocks noChangeAspect="1"/>
+          </p:cNvPicPr>
+          <p:nvPr/>
+        </p:nvPicPr>
+        <p:blipFill>
+          <a:blip r:embed="rId2"/>
+          <a:stretch>
+            <a:fillRect/>
+          </a:stretch>
+        </p:blipFill>
+        <p:spPr>
+          <a:xfrm>
+            <a:off x="2578510" y="1690687"/>
+            <a:ext cx="6314765" cy="5091753"/>
+          </a:xfrm>
+          <a:prstGeom prst="rect">
+            <a:avLst/>
+          </a:prstGeom>
+        </p:spPr>
+      </p:pic>
+    </p:spTree>
+    <p:extLst>
+      <p:ext uri="{BB962C8B-B14F-4D97-AF65-F5344CB8AC3E}">
+        <p14:creationId xmlns:p14="http://schemas.microsoft.com/office/powerpoint/2010/main" val="3621614203"/>
+      </p:ext>
+    </p:extLst>
+  </p:cSld>
+  <p:clrMapOvr>
+    <a:masterClrMapping/>
+  </p:clrMapOvr>
+</p:sld>
+</file>
+
+<file path=ppt/slides/slide12.xml><?xml version="1.0" encoding="utf-8"?>
+<p:sld xmlns:a="http://schemas.openxmlformats.org/drawingml/2006/main" xmlns:r="http://schemas.openxmlformats.org/officeDocument/2006/relationships" xmlns:p="http://schemas.openxmlformats.org/presentationml/2006/main">
+  <p:cSld>
+    <p:spTree>
+      <p:nvGrpSpPr>
+        <p:cNvPr id="1" name="">
+          <a:extLst>
+            <a:ext uri="{FF2B5EF4-FFF2-40B4-BE49-F238E27FC236}">
+              <a16:creationId xmlns:a16="http://schemas.microsoft.com/office/drawing/2014/main" id="{A6FC07F8-07FC-78EE-69A7-0032F20D3A4C}"/>
+            </a:ext>
+          </a:extLst>
+        </p:cNvPr>
+        <p:cNvGrpSpPr/>
+        <p:nvPr/>
+      </p:nvGrpSpPr>
+      <p:grpSpPr>
+        <a:xfrm>
+          <a:off x="0" y="0"/>
+          <a:ext cx="0" cy="0"/>
+          <a:chOff x="0" y="0"/>
+          <a:chExt cx="0" cy="0"/>
+        </a:xfrm>
+      </p:grpSpPr>
+      <p:sp>
+        <p:nvSpPr>
+          <p:cNvPr id="2" name="Title 1">
+            <a:extLst>
+              <a:ext uri="{FF2B5EF4-FFF2-40B4-BE49-F238E27FC236}">
+                <a16:creationId xmlns:a16="http://schemas.microsoft.com/office/drawing/2014/main" id="{2CE7FF60-A127-AC6E-A35E-FE82D078A81D}"/>
+              </a:ext>
+            </a:extLst>
+          </p:cNvPr>
+          <p:cNvSpPr>
+            <a:spLocks noGrp="1"/>
+          </p:cNvSpPr>
+          <p:nvPr>
+            <p:ph type="title"/>
+          </p:nvPr>
+        </p:nvSpPr>
+        <p:spPr/>
+        <p:txBody>
+          <a:bodyPr/>
+          <a:lstStyle/>
+          <a:p>
+            <a:r>
+              <a:rPr lang="en-US"/>
+              <a:t>Damage classification:</a:t>
+            </a:r>
+            <a:br>
+              <a:rPr lang="en-US"/>
+            </a:br>
+            <a:r>
+              <a:rPr lang="en-US"/>
+              <a:t>Extra Trees Feature Importances</a:t>
+            </a:r>
+            <a:endParaRPr lang="en-US" dirty="0"/>
+          </a:p>
+        </p:txBody>
+      </p:sp>
+      <p:pic>
+        <p:nvPicPr>
+          <p:cNvPr id="4" name="Picture 3" descr="A graph with blue and white bars&#10;&#10;AI-generated content may be incorrect.">
+            <a:extLst>
+              <a:ext uri="{FF2B5EF4-FFF2-40B4-BE49-F238E27FC236}">
+                <a16:creationId xmlns:a16="http://schemas.microsoft.com/office/drawing/2014/main" id="{047DE5C9-CC41-EE53-D474-4BEA98BBCF80}"/>
+              </a:ext>
+            </a:extLst>
+          </p:cNvPr>
+          <p:cNvPicPr>
+            <a:picLocks noChangeAspect="1"/>
+          </p:cNvPicPr>
+          <p:nvPr/>
+        </p:nvPicPr>
+        <p:blipFill>
+          <a:blip r:embed="rId2"/>
+          <a:stretch>
+            <a:fillRect/>
+          </a:stretch>
+        </p:blipFill>
+        <p:spPr>
+          <a:xfrm>
+            <a:off x="1638205" y="1829435"/>
+            <a:ext cx="7772400" cy="4663440"/>
+          </a:xfrm>
+          <a:prstGeom prst="rect">
+            <a:avLst/>
+          </a:prstGeom>
+        </p:spPr>
+      </p:pic>
+    </p:spTree>
+    <p:extLst>
+      <p:ext uri="{BB962C8B-B14F-4D97-AF65-F5344CB8AC3E}">
+        <p14:creationId xmlns:p14="http://schemas.microsoft.com/office/powerpoint/2010/main" val="2939049772"/>
+      </p:ext>
+    </p:extLst>
+  </p:cSld>
+  <p:clrMapOvr>
+    <a:masterClrMapping/>
+  </p:clrMapOvr>
+</p:sld>
+</file>
+
+<file path=ppt/slides/slide13.xml><?xml version="1.0" encoding="utf-8"?>
+<p:sld xmlns:a="http://schemas.openxmlformats.org/drawingml/2006/main" xmlns:r="http://schemas.openxmlformats.org/officeDocument/2006/relationships" xmlns:p="http://schemas.openxmlformats.org/presentationml/2006/main">
+  <p:cSld>
+    <p:spTree>
+      <p:nvGrpSpPr>
         <p:cNvPr id="1" name=""/>
         <p:cNvGrpSpPr/>
         <p:nvPr/>
@@ -4024,7 +4382,7 @@
             </a:pPr>
             <a:r>
               <a:rPr lang="en-US" dirty="0"/>
-              <a:t>Slight edge over “Naïve Mean” estimator” </a:t>
+              <a:t>Slight edge over “Naïve Mean” estimator</a:t>
             </a:r>
           </a:p>
         </p:txBody>
@@ -4042,7 +4400,7 @@
 </p:sld>
 </file>
 
-<file path=ppt/slides/slide11.xml><?xml version="1.0" encoding="utf-8"?>
+<file path=ppt/slides/slide14.xml><?xml version="1.0" encoding="utf-8"?>
 <p:sld xmlns:a="http://schemas.openxmlformats.org/drawingml/2006/main" xmlns:r="http://schemas.openxmlformats.org/officeDocument/2006/relationships" xmlns:p="http://schemas.openxmlformats.org/presentationml/2006/main">
   <p:cSld>
     <p:spTree>
@@ -4654,7 +5012,7 @@
 </p:sld>
 </file>
 
-<file path=ppt/slides/slide12.xml><?xml version="1.0" encoding="utf-8"?>
+<file path=ppt/slides/slide15.xml><?xml version="1.0" encoding="utf-8"?>
 <p:sld xmlns:a="http://schemas.openxmlformats.org/drawingml/2006/main" xmlns:r="http://schemas.openxmlformats.org/officeDocument/2006/relationships" xmlns:p="http://schemas.openxmlformats.org/presentationml/2006/main">
   <p:cSld>
     <p:spTree>
@@ -4749,7 +5107,7 @@
 </p:sld>
 </file>
 
-<file path=ppt/slides/slide13.xml><?xml version="1.0" encoding="utf-8"?>
+<file path=ppt/slides/slide16.xml><?xml version="1.0" encoding="utf-8"?>
 <p:sld xmlns:a="http://schemas.openxmlformats.org/drawingml/2006/main" xmlns:r="http://schemas.openxmlformats.org/officeDocument/2006/relationships" xmlns:p="http://schemas.openxmlformats.org/presentationml/2006/main">
   <p:cSld>
     <p:bg>
@@ -4884,7 +5242,7 @@
 </p:sld>
 </file>
 
-<file path=ppt/slides/slide14.xml><?xml version="1.0" encoding="utf-8"?>
+<file path=ppt/slides/slide17.xml><?xml version="1.0" encoding="utf-8"?>
 <p:sld xmlns:a="http://schemas.openxmlformats.org/drawingml/2006/main" xmlns:r="http://schemas.openxmlformats.org/officeDocument/2006/relationships" xmlns:p="http://schemas.openxmlformats.org/presentationml/2006/main">
   <p:cSld>
     <p:spTree>
@@ -5011,7 +5369,7 @@
 </p:sld>
 </file>
 
-<file path=ppt/slides/slide15.xml><?xml version="1.0" encoding="utf-8"?>
+<file path=ppt/slides/slide18.xml><?xml version="1.0" encoding="utf-8"?>
 <p:sld xmlns:a="http://schemas.openxmlformats.org/drawingml/2006/main" xmlns:r="http://schemas.openxmlformats.org/officeDocument/2006/relationships" xmlns:p="http://schemas.openxmlformats.org/presentationml/2006/main">
   <p:cSld>
     <p:spTree>

</xml_diff>